<commit_message>
Close to ready, many changes
</commit_message>
<xml_diff>
--- a/04 - Delay/Delay.pptx
+++ b/04 - Delay/Delay.pptx
@@ -229,7 +229,7 @@
           <a:p>
             <a:fld id="{BE487CCF-3B53-4F90-977B-B099D72D42DC}" type="datetimeFigureOut">
               <a:rPr lang="en-GB" smtClean="0"/>
-              <a:t>07/12/2023</a:t>
+              <a:t>21/12/2023</a:t>
             </a:fld>
             <a:endParaRPr lang="en-GB"/>
           </a:p>
@@ -4122,7 +4122,7 @@
           <a:p>
             <a:fld id="{F8A5948D-6B6B-4AEB-B022-F2A9ADD6F77D}" type="datetimeFigureOut">
               <a:rPr lang="en-GB" smtClean="0"/>
-              <a:t>07/12/2023</a:t>
+              <a:t>21/12/2023</a:t>
             </a:fld>
             <a:endParaRPr lang="en-GB"/>
           </a:p>
@@ -4322,7 +4322,7 @@
           <a:p>
             <a:fld id="{F8A5948D-6B6B-4AEB-B022-F2A9ADD6F77D}" type="datetimeFigureOut">
               <a:rPr lang="en-GB" smtClean="0"/>
-              <a:t>07/12/2023</a:t>
+              <a:t>21/12/2023</a:t>
             </a:fld>
             <a:endParaRPr lang="en-GB"/>
           </a:p>
@@ -4532,7 +4532,7 @@
           <a:p>
             <a:fld id="{F8A5948D-6B6B-4AEB-B022-F2A9ADD6F77D}" type="datetimeFigureOut">
               <a:rPr lang="en-GB" smtClean="0"/>
-              <a:t>07/12/2023</a:t>
+              <a:t>21/12/2023</a:t>
             </a:fld>
             <a:endParaRPr lang="en-GB"/>
           </a:p>
@@ -5966,7 +5966,7 @@
           <a:p>
             <a:fld id="{F8A5948D-6B6B-4AEB-B022-F2A9ADD6F77D}" type="datetimeFigureOut">
               <a:rPr lang="en-GB" smtClean="0"/>
-              <a:t>07/12/2023</a:t>
+              <a:t>21/12/2023</a:t>
             </a:fld>
             <a:endParaRPr lang="en-GB"/>
           </a:p>
@@ -6648,7 +6648,7 @@
           <a:p>
             <a:fld id="{F8A5948D-6B6B-4AEB-B022-F2A9ADD6F77D}" type="datetimeFigureOut">
               <a:rPr lang="en-GB" smtClean="0"/>
-              <a:t>07/12/2023</a:t>
+              <a:t>21/12/2023</a:t>
             </a:fld>
             <a:endParaRPr lang="en-GB"/>
           </a:p>
@@ -6916,7 +6916,7 @@
           <a:p>
             <a:fld id="{F8A5948D-6B6B-4AEB-B022-F2A9ADD6F77D}" type="datetimeFigureOut">
               <a:rPr lang="en-GB" smtClean="0"/>
-              <a:t>07/12/2023</a:t>
+              <a:t>21/12/2023</a:t>
             </a:fld>
             <a:endParaRPr lang="en-GB"/>
           </a:p>
@@ -7331,7 +7331,7 @@
           <a:p>
             <a:fld id="{F8A5948D-6B6B-4AEB-B022-F2A9ADD6F77D}" type="datetimeFigureOut">
               <a:rPr lang="en-GB" smtClean="0"/>
-              <a:t>07/12/2023</a:t>
+              <a:t>21/12/2023</a:t>
             </a:fld>
             <a:endParaRPr lang="en-GB"/>
           </a:p>
@@ -7473,7 +7473,7 @@
           <a:p>
             <a:fld id="{F8A5948D-6B6B-4AEB-B022-F2A9ADD6F77D}" type="datetimeFigureOut">
               <a:rPr lang="en-GB" smtClean="0"/>
-              <a:t>07/12/2023</a:t>
+              <a:t>21/12/2023</a:t>
             </a:fld>
             <a:endParaRPr lang="en-GB"/>
           </a:p>
@@ -7586,7 +7586,7 @@
           <a:p>
             <a:fld id="{F8A5948D-6B6B-4AEB-B022-F2A9ADD6F77D}" type="datetimeFigureOut">
               <a:rPr lang="en-GB" smtClean="0"/>
-              <a:t>07/12/2023</a:t>
+              <a:t>21/12/2023</a:t>
             </a:fld>
             <a:endParaRPr lang="en-GB"/>
           </a:p>
@@ -7899,7 +7899,7 @@
           <a:p>
             <a:fld id="{F8A5948D-6B6B-4AEB-B022-F2A9ADD6F77D}" type="datetimeFigureOut">
               <a:rPr lang="en-GB" smtClean="0"/>
-              <a:t>07/12/2023</a:t>
+              <a:t>21/12/2023</a:t>
             </a:fld>
             <a:endParaRPr lang="en-GB"/>
           </a:p>
@@ -8188,7 +8188,7 @@
           <a:p>
             <a:fld id="{F8A5948D-6B6B-4AEB-B022-F2A9ADD6F77D}" type="datetimeFigureOut">
               <a:rPr lang="en-GB" smtClean="0"/>
-              <a:t>07/12/2023</a:t>
+              <a:t>21/12/2023</a:t>
             </a:fld>
             <a:endParaRPr lang="en-GB"/>
           </a:p>
@@ -8431,7 +8431,7 @@
           <a:p>
             <a:fld id="{F8A5948D-6B6B-4AEB-B022-F2A9ADD6F77D}" type="datetimeFigureOut">
               <a:rPr lang="en-GB" smtClean="0"/>
-              <a:t>07/12/2023</a:t>
+              <a:t>21/12/2023</a:t>
             </a:fld>
             <a:endParaRPr lang="en-GB"/>
           </a:p>
@@ -47483,8 +47483,8 @@
         </p:nvSpPr>
         <p:spPr>
           <a:xfrm>
-            <a:off x="1524000" y="765175"/>
-            <a:ext cx="9144000" cy="3384550"/>
+            <a:off x="398454" y="765175"/>
+            <a:ext cx="10269546" cy="3384550"/>
           </a:xfrm>
         </p:spPr>
         <p:txBody>

</xml_diff>